<commit_message>
Minor changes chapter 8
</commit_message>
<xml_diff>
--- a/Basic_python/8 Group data.pptx
+++ b/Basic_python/8 Group data.pptx
@@ -133,14 +133,6 @@
     </p:ext>
   </p:extLst>
 </p:presentation>
-</file>
-
-<file path=ppt/revisionInfo.xml><?xml version="1.0" encoding="utf-8"?>
-<p1510:revInfo xmlns:a="http://schemas.openxmlformats.org/drawingml/2006/main" xmlns:r="http://schemas.openxmlformats.org/officeDocument/2006/relationships" xmlns:p1510="http://schemas.microsoft.com/office/powerpoint/2015/10/main">
-  <p1510:revLst>
-    <p1510:client id="{AC658C29-150B-461D-AD19-25434422E4BC}" v="1" dt="2022-05-25T13:21:13.487"/>
-  </p1510:revLst>
-</p1510:revInfo>
 </file>
 
 <file path=ppt/changesInfos/changesInfo1.xml><?xml version="1.0" encoding="utf-8"?>
@@ -1985,6 +1977,90 @@
     </pc:docChg>
   </pc:docChgLst>
   <pc:docChgLst>
+    <pc:chgData name="Brent Pulmans" userId="8ae858ac-1a5b-43d2-9c3f-1bf2d06d427e" providerId="ADAL" clId="{2F6EC10D-F1FA-4716-9C68-B3968226D88D}"/>
+    <pc:docChg chg="modSld">
+      <pc:chgData name="Brent Pulmans" userId="8ae858ac-1a5b-43d2-9c3f-1bf2d06d427e" providerId="ADAL" clId="{2F6EC10D-F1FA-4716-9C68-B3968226D88D}" dt="2022-10-11T20:37:45.692" v="9" actId="20577"/>
+      <pc:docMkLst>
+        <pc:docMk/>
+      </pc:docMkLst>
+      <pc:sldChg chg="modSp mod">
+        <pc:chgData name="Brent Pulmans" userId="8ae858ac-1a5b-43d2-9c3f-1bf2d06d427e" providerId="ADAL" clId="{2F6EC10D-F1FA-4716-9C68-B3968226D88D}" dt="2022-10-11T20:34:54.862" v="3" actId="20577"/>
+        <pc:sldMkLst>
+          <pc:docMk/>
+          <pc:sldMk cId="4108296559" sldId="385"/>
+        </pc:sldMkLst>
+        <pc:spChg chg="mod">
+          <ac:chgData name="Brent Pulmans" userId="8ae858ac-1a5b-43d2-9c3f-1bf2d06d427e" providerId="ADAL" clId="{2F6EC10D-F1FA-4716-9C68-B3968226D88D}" dt="2022-10-11T20:34:54.862" v="3" actId="20577"/>
+          <ac:spMkLst>
+            <pc:docMk/>
+            <pc:sldMk cId="4108296559" sldId="385"/>
+            <ac:spMk id="14" creationId="{9B99AB92-8648-4BD5-93C9-D2FFFDD3E9AE}"/>
+          </ac:spMkLst>
+        </pc:spChg>
+      </pc:sldChg>
+      <pc:sldChg chg="modSp mod">
+        <pc:chgData name="Brent Pulmans" userId="8ae858ac-1a5b-43d2-9c3f-1bf2d06d427e" providerId="ADAL" clId="{2F6EC10D-F1FA-4716-9C68-B3968226D88D}" dt="2022-10-11T20:31:32.009" v="1" actId="20577"/>
+        <pc:sldMkLst>
+          <pc:docMk/>
+          <pc:sldMk cId="12605234" sldId="386"/>
+        </pc:sldMkLst>
+        <pc:spChg chg="mod">
+          <ac:chgData name="Brent Pulmans" userId="8ae858ac-1a5b-43d2-9c3f-1bf2d06d427e" providerId="ADAL" clId="{2F6EC10D-F1FA-4716-9C68-B3968226D88D}" dt="2022-10-11T20:31:32.009" v="1" actId="20577"/>
+          <ac:spMkLst>
+            <pc:docMk/>
+            <pc:sldMk cId="12605234" sldId="386"/>
+            <ac:spMk id="3" creationId="{00000000-0000-0000-0000-000000000000}"/>
+          </ac:spMkLst>
+        </pc:spChg>
+      </pc:sldChg>
+      <pc:sldChg chg="modSp mod">
+        <pc:chgData name="Brent Pulmans" userId="8ae858ac-1a5b-43d2-9c3f-1bf2d06d427e" providerId="ADAL" clId="{2F6EC10D-F1FA-4716-9C68-B3968226D88D}" dt="2022-10-11T20:37:34.282" v="5" actId="20577"/>
+        <pc:sldMkLst>
+          <pc:docMk/>
+          <pc:sldMk cId="1789700859" sldId="388"/>
+        </pc:sldMkLst>
+        <pc:spChg chg="mod">
+          <ac:chgData name="Brent Pulmans" userId="8ae858ac-1a5b-43d2-9c3f-1bf2d06d427e" providerId="ADAL" clId="{2F6EC10D-F1FA-4716-9C68-B3968226D88D}" dt="2022-10-11T20:37:34.282" v="5" actId="20577"/>
+          <ac:spMkLst>
+            <pc:docMk/>
+            <pc:sldMk cId="1789700859" sldId="388"/>
+            <ac:spMk id="14" creationId="{9B99AB92-8648-4BD5-93C9-D2FFFDD3E9AE}"/>
+          </ac:spMkLst>
+        </pc:spChg>
+      </pc:sldChg>
+      <pc:sldChg chg="modSp mod">
+        <pc:chgData name="Brent Pulmans" userId="8ae858ac-1a5b-43d2-9c3f-1bf2d06d427e" providerId="ADAL" clId="{2F6EC10D-F1FA-4716-9C68-B3968226D88D}" dt="2022-10-11T20:37:41.253" v="7" actId="20577"/>
+        <pc:sldMkLst>
+          <pc:docMk/>
+          <pc:sldMk cId="2167648545" sldId="391"/>
+        </pc:sldMkLst>
+        <pc:spChg chg="mod">
+          <ac:chgData name="Brent Pulmans" userId="8ae858ac-1a5b-43d2-9c3f-1bf2d06d427e" providerId="ADAL" clId="{2F6EC10D-F1FA-4716-9C68-B3968226D88D}" dt="2022-10-11T20:37:41.253" v="7" actId="20577"/>
+          <ac:spMkLst>
+            <pc:docMk/>
+            <pc:sldMk cId="2167648545" sldId="391"/>
+            <ac:spMk id="15" creationId="{42B541B0-7FF3-4A3B-BD57-ADB92D23D268}"/>
+          </ac:spMkLst>
+        </pc:spChg>
+      </pc:sldChg>
+      <pc:sldChg chg="modSp mod">
+        <pc:chgData name="Brent Pulmans" userId="8ae858ac-1a5b-43d2-9c3f-1bf2d06d427e" providerId="ADAL" clId="{2F6EC10D-F1FA-4716-9C68-B3968226D88D}" dt="2022-10-11T20:37:45.692" v="9" actId="20577"/>
+        <pc:sldMkLst>
+          <pc:docMk/>
+          <pc:sldMk cId="308927556" sldId="396"/>
+        </pc:sldMkLst>
+        <pc:spChg chg="mod">
+          <ac:chgData name="Brent Pulmans" userId="8ae858ac-1a5b-43d2-9c3f-1bf2d06d427e" providerId="ADAL" clId="{2F6EC10D-F1FA-4716-9C68-B3968226D88D}" dt="2022-10-11T20:37:45.692" v="9" actId="20577"/>
+          <ac:spMkLst>
+            <pc:docMk/>
+            <pc:sldMk cId="308927556" sldId="396"/>
+            <ac:spMk id="20" creationId="{004FABA5-CE99-42DE-B9D2-795667DBFA1F}"/>
+          </ac:spMkLst>
+        </pc:spChg>
+      </pc:sldChg>
+    </pc:docChg>
+  </pc:docChgLst>
+  <pc:docChgLst>
     <pc:chgData name="Christel Maes" userId="7e61469a-7c21-464c-bace-a1bda262211a" providerId="ADAL" clId="{80F0C9AD-C6D8-465F-9969-B53C5947F5D6}"/>
     <pc:docChg chg="modSld">
       <pc:chgData name="Christel Maes" userId="7e61469a-7c21-464c-bace-a1bda262211a" providerId="ADAL" clId="{80F0C9AD-C6D8-465F-9969-B53C5947F5D6}" dt="2020-09-10T15:27:56.430" v="0"/>
@@ -2357,7 +2433,7 @@
           <a:p>
             <a:fld id="{4D53584B-980D-4F7D-BA36-682FCDF648BB}" type="datetimeFigureOut">
               <a:rPr lang="nl-BE" smtClean="0"/>
-              <a:t>25/05/2022</a:t>
+              <a:t>11/10/2022</a:t>
             </a:fld>
             <a:endParaRPr lang="nl-BE"/>
           </a:p>
@@ -2774,7 +2850,7 @@
           <a:p>
             <a:fld id="{9DBA54DB-1B16-4AD1-A9F9-560BFE3100B9}" type="datetime1">
               <a:rPr lang="nl-BE" smtClean="0"/>
-              <a:t>25/05/2022</a:t>
+              <a:t>11/10/2022</a:t>
             </a:fld>
             <a:endParaRPr lang="nl-BE"/>
           </a:p>
@@ -3026,7 +3102,7 @@
           <a:p>
             <a:fld id="{7BE4DD14-A5A2-4EBE-8108-B4151B97AFA3}" type="datetime1">
               <a:rPr lang="nl-BE" smtClean="0"/>
-              <a:t>25/05/2022</a:t>
+              <a:t>11/10/2022</a:t>
             </a:fld>
             <a:endParaRPr lang="nl-BE"/>
           </a:p>
@@ -3206,7 +3282,7 @@
           <a:p>
             <a:fld id="{3FD6D2C0-23FD-48D4-8694-5C8CCB26DE5B}" type="datetime1">
               <a:rPr lang="nl-BE" smtClean="0"/>
-              <a:t>25/05/2022</a:t>
+              <a:t>11/10/2022</a:t>
             </a:fld>
             <a:endParaRPr lang="nl-BE"/>
           </a:p>
@@ -3405,7 +3481,7 @@
           <a:p>
             <a:fld id="{7F502A1D-A910-4100-B61A-B3604D95ED9D}" type="datetime1">
               <a:rPr lang="nl-BE" smtClean="0"/>
-              <a:t>25/05/2022</a:t>
+              <a:t>11/10/2022</a:t>
             </a:fld>
             <a:endParaRPr lang="nl-BE"/>
           </a:p>
@@ -3656,7 +3732,7 @@
           <a:p>
             <a:fld id="{FC274EC3-A4C1-4AD9-8B7B-E6619E9154A0}" type="datetime1">
               <a:rPr lang="nl-BE" smtClean="0"/>
-              <a:t>25/05/2022</a:t>
+              <a:t>11/10/2022</a:t>
             </a:fld>
             <a:endParaRPr lang="nl-BE"/>
           </a:p>
@@ -3888,7 +3964,7 @@
           <a:p>
             <a:fld id="{19D8E8DE-ADBC-4B34-812D-AE94AC273780}" type="datetime1">
               <a:rPr lang="nl-BE" smtClean="0"/>
-              <a:t>25/05/2022</a:t>
+              <a:t>11/10/2022</a:t>
             </a:fld>
             <a:endParaRPr lang="nl-BE"/>
           </a:p>
@@ -4255,7 +4331,7 @@
           <a:p>
             <a:fld id="{31505BAB-8768-4F28-94D4-0FB2B7E5CAF3}" type="datetime1">
               <a:rPr lang="nl-BE" smtClean="0"/>
-              <a:t>25/05/2022</a:t>
+              <a:t>11/10/2022</a:t>
             </a:fld>
             <a:endParaRPr lang="nl-BE"/>
           </a:p>
@@ -4373,7 +4449,7 @@
           <a:p>
             <a:fld id="{0E166F45-FB20-41E3-B1E4-21B171F68161}" type="datetime1">
               <a:rPr lang="nl-BE" smtClean="0"/>
-              <a:t>25/05/2022</a:t>
+              <a:t>11/10/2022</a:t>
             </a:fld>
             <a:endParaRPr lang="nl-BE"/>
           </a:p>
@@ -4468,7 +4544,7 @@
           <a:p>
             <a:fld id="{0FF58E41-313F-407F-8EC3-61136F94D127}" type="datetime1">
               <a:rPr lang="nl-BE" smtClean="0"/>
-              <a:t>25/05/2022</a:t>
+              <a:t>11/10/2022</a:t>
             </a:fld>
             <a:endParaRPr lang="nl-BE"/>
           </a:p>
@@ -4745,7 +4821,7 @@
           <a:p>
             <a:fld id="{B85B5F37-38DA-4EAB-81BB-622D74C0BD14}" type="datetime1">
               <a:rPr lang="nl-BE" smtClean="0"/>
-              <a:t>25/05/2022</a:t>
+              <a:t>11/10/2022</a:t>
             </a:fld>
             <a:endParaRPr lang="nl-BE"/>
           </a:p>
@@ -4998,7 +5074,7 @@
           <a:p>
             <a:fld id="{AD728687-702D-4DA9-A09E-7D549958D675}" type="datetime1">
               <a:rPr lang="nl-BE" smtClean="0"/>
-              <a:t>25/05/2022</a:t>
+              <a:t>11/10/2022</a:t>
             </a:fld>
             <a:endParaRPr lang="nl-BE"/>
           </a:p>
@@ -5211,7 +5287,7 @@
           <a:p>
             <a:fld id="{99CD3CD4-31DA-4C13-BE74-A8E9DA10F56B}" type="datetime1">
               <a:rPr lang="nl-BE" smtClean="0"/>
-              <a:t>25/05/2022</a:t>
+              <a:t>11/10/2022</a:t>
             </a:fld>
             <a:endParaRPr lang="nl-BE"/>
           </a:p>
@@ -5973,7 +6049,7 @@
               <a:buNone/>
             </a:pPr>
             <a:r>
-              <a:rPr lang="nl-BE" sz="2400">
+              <a:rPr lang="nl-BE" sz="2400" dirty="0">
                 <a:solidFill>
                   <a:srgbClr val="FF0000"/>
                 </a:solidFill>
@@ -5983,14 +6059,14 @@
               <a:t>program</a:t>
             </a:r>
             <a:r>
-              <a:rPr lang="nl-BE" sz="2400">
+              <a:rPr lang="nl-BE" sz="2400" dirty="0">
                 <a:latin typeface="Consolas" panose="020B0609020204030204" pitchFamily="49" charset="0"/>
                 <a:cs typeface="Courier New" panose="02070309020205020404" pitchFamily="49" charset="0"/>
               </a:rPr>
               <a:t> </a:t>
             </a:r>
             <a:r>
-              <a:rPr lang="nl-BE" sz="2400">
+              <a:rPr lang="nl-BE" sz="2400" dirty="0">
                 <a:solidFill>
                   <a:srgbClr val="FF0000"/>
                 </a:solidFill>
@@ -6000,7 +6076,7 @@
               <a:t>start </a:t>
             </a:r>
             <a:r>
-              <a:rPr lang="nl-BE" sz="2400" err="1">
+              <a:rPr lang="nl-BE" sz="2400" dirty="0" err="1">
                 <a:solidFill>
                   <a:srgbClr val="FF0000"/>
                 </a:solidFill>
@@ -6009,7 +6085,7 @@
               </a:rPr>
               <a:t>instructions</a:t>
             </a:r>
-            <a:endParaRPr lang="nl-BE" sz="2400">
+            <a:endParaRPr lang="nl-BE" sz="2400" dirty="0">
               <a:solidFill>
                 <a:srgbClr val="FF0000"/>
               </a:solidFill>
@@ -6021,7 +6097,7 @@
             <a:pPr marL="0" indent="0">
               <a:buNone/>
             </a:pPr>
-            <a:endParaRPr lang="nl-BE" sz="2400">
+            <a:endParaRPr lang="nl-BE" sz="2400" dirty="0">
               <a:latin typeface="Consolas" panose="020B0609020204030204" pitchFamily="49" charset="0"/>
               <a:cs typeface="Courier New" panose="02070309020205020404" pitchFamily="49" charset="0"/>
             </a:endParaRPr>
@@ -6031,14 +6107,28 @@
               <a:buNone/>
             </a:pPr>
             <a:r>
-              <a:rPr lang="nl-BE" sz="2400" err="1">
+              <a:rPr lang="nl-BE" sz="2400" dirty="0" err="1">
                 <a:latin typeface="Consolas" panose="020B0609020204030204" pitchFamily="49" charset="0"/>
                 <a:cs typeface="Courier New" panose="02070309020205020404" pitchFamily="49" charset="0"/>
               </a:rPr>
-              <a:t>while not_end_data</a:t>
-            </a:r>
-            <a:r>
-              <a:rPr lang="nl-BE" sz="2400">
+              <a:t>while</a:t>
+            </a:r>
+            <a:r>
+              <a:rPr lang="nl-BE" sz="2400" dirty="0">
+                <a:latin typeface="Consolas" panose="020B0609020204030204" pitchFamily="49" charset="0"/>
+                <a:cs typeface="Courier New" panose="02070309020205020404" pitchFamily="49" charset="0"/>
+              </a:rPr>
+              <a:t> </a:t>
+            </a:r>
+            <a:r>
+              <a:rPr lang="nl-BE" sz="2400" dirty="0" err="1">
+                <a:latin typeface="Consolas" panose="020B0609020204030204" pitchFamily="49" charset="0"/>
+                <a:cs typeface="Courier New" panose="02070309020205020404" pitchFamily="49" charset="0"/>
+              </a:rPr>
+              <a:t>not_end_data</a:t>
+            </a:r>
+            <a:r>
+              <a:rPr lang="nl-BE" sz="2400" dirty="0">
                 <a:latin typeface="Consolas" panose="020B0609020204030204" pitchFamily="49" charset="0"/>
                 <a:cs typeface="Courier New" panose="02070309020205020404" pitchFamily="49" charset="0"/>
               </a:rPr>
@@ -6050,14 +6140,14 @@
               <a:buNone/>
             </a:pPr>
             <a:r>
-              <a:rPr lang="nl-BE" sz="2400">
+              <a:rPr lang="nl-BE" sz="2400" dirty="0">
                 <a:latin typeface="Consolas" panose="020B0609020204030204" pitchFamily="49" charset="0"/>
                 <a:cs typeface="Courier New" panose="02070309020205020404" pitchFamily="49" charset="0"/>
               </a:rPr>
               <a:t>    </a:t>
             </a:r>
             <a:r>
-              <a:rPr lang="nl-BE" sz="2400" err="1">
+              <a:rPr lang="nl-BE" sz="2400" dirty="0" err="1">
                 <a:solidFill>
                   <a:srgbClr val="4584B6"/>
                 </a:solidFill>
@@ -6067,7 +6157,7 @@
               <a:t>group</a:t>
             </a:r>
             <a:r>
-              <a:rPr lang="nl-BE" sz="2400">
+              <a:rPr lang="nl-BE" sz="2400" dirty="0">
                 <a:solidFill>
                   <a:srgbClr val="4584B6"/>
                 </a:solidFill>
@@ -6077,7 +6167,7 @@
               <a:t> start </a:t>
             </a:r>
             <a:r>
-              <a:rPr lang="nl-BE" sz="2400" err="1">
+              <a:rPr lang="nl-BE" sz="2400" dirty="0" err="1">
                 <a:solidFill>
                   <a:srgbClr val="4584B6"/>
                 </a:solidFill>
@@ -6086,7 +6176,7 @@
               </a:rPr>
               <a:t>instructions</a:t>
             </a:r>
-            <a:endParaRPr lang="nl-BE" sz="2400">
+            <a:endParaRPr lang="nl-BE" sz="2400" dirty="0">
               <a:solidFill>
                 <a:srgbClr val="4584B6"/>
               </a:solidFill>
@@ -6099,63 +6189,63 @@
               <a:buNone/>
             </a:pPr>
             <a:r>
-              <a:rPr lang="nl-BE" sz="2400">
+              <a:rPr lang="nl-BE" sz="2400" dirty="0">
                 <a:latin typeface="Consolas" panose="020B0609020204030204" pitchFamily="49" charset="0"/>
                 <a:cs typeface="Courier New" panose="02070309020205020404" pitchFamily="49" charset="0"/>
               </a:rPr>
               <a:t>    </a:t>
             </a:r>
             <a:r>
-              <a:rPr lang="nl-BE" sz="2400" err="1">
+              <a:rPr lang="nl-BE" sz="2400" dirty="0" err="1">
                 <a:latin typeface="Consolas" panose="020B0609020204030204" pitchFamily="49" charset="0"/>
                 <a:cs typeface="Courier New" panose="02070309020205020404" pitchFamily="49" charset="0"/>
               </a:rPr>
               <a:t>while</a:t>
             </a:r>
             <a:r>
-              <a:rPr lang="nl-BE" sz="2400">
+              <a:rPr lang="nl-BE" sz="2400" dirty="0">
                 <a:latin typeface="Consolas" panose="020B0609020204030204" pitchFamily="49" charset="0"/>
                 <a:cs typeface="Courier New" panose="02070309020205020404" pitchFamily="49" charset="0"/>
               </a:rPr>
               <a:t> </a:t>
             </a:r>
             <a:r>
-              <a:rPr lang="nl-BE" sz="2400" err="1">
+              <a:rPr lang="nl-BE" sz="2400" dirty="0" err="1">
                 <a:latin typeface="Consolas" panose="020B0609020204030204" pitchFamily="49" charset="0"/>
                 <a:cs typeface="Courier New" panose="02070309020205020404" pitchFamily="49" charset="0"/>
               </a:rPr>
               <a:t>not_end_data</a:t>
             </a:r>
             <a:r>
-              <a:rPr lang="nl-BE" sz="2400">
+              <a:rPr lang="nl-BE" sz="2400" dirty="0">
                 <a:latin typeface="Consolas" panose="020B0609020204030204" pitchFamily="49" charset="0"/>
                 <a:cs typeface="Courier New" panose="02070309020205020404" pitchFamily="49" charset="0"/>
               </a:rPr>
-              <a:t> and </a:t>
-            </a:r>
-            <a:r>
-              <a:rPr lang="nl-BE" sz="2400" err="1">
+              <a:t> </a:t>
+            </a:r>
+            <a:r>
+              <a:rPr lang="nl-BE" sz="2400" dirty="0" err="1">
                 <a:latin typeface="Consolas" panose="020B0609020204030204" pitchFamily="49" charset="0"/>
                 <a:cs typeface="Courier New" panose="02070309020205020404" pitchFamily="49" charset="0"/>
               </a:rPr>
-              <a:t>in_the</a:t>
-            </a:r>
-            <a:r>
-              <a:rPr lang="nl-BE" sz="2400">
+              <a:t>and</a:t>
+            </a:r>
+            <a:r>
+              <a:rPr lang="nl-BE" sz="2400" dirty="0">
                 <a:latin typeface="Consolas" panose="020B0609020204030204" pitchFamily="49" charset="0"/>
                 <a:cs typeface="Courier New" panose="02070309020205020404" pitchFamily="49" charset="0"/>
               </a:rPr>
               <a:t> </a:t>
             </a:r>
             <a:r>
-              <a:rPr lang="nl-BE" sz="2400" err="1">
+              <a:rPr lang="nl-BE" sz="2400" dirty="0" err="1">
                 <a:latin typeface="Consolas" panose="020B0609020204030204" pitchFamily="49" charset="0"/>
                 <a:cs typeface="Courier New" panose="02070309020205020404" pitchFamily="49" charset="0"/>
               </a:rPr>
-              <a:t>same_group</a:t>
-            </a:r>
-            <a:r>
-              <a:rPr lang="nl-BE" sz="2400">
+              <a:t>in_the_same_group</a:t>
+            </a:r>
+            <a:r>
+              <a:rPr lang="nl-BE" sz="2400" dirty="0">
                 <a:latin typeface="Consolas" panose="020B0609020204030204" pitchFamily="49" charset="0"/>
                 <a:cs typeface="Courier New" panose="02070309020205020404" pitchFamily="49" charset="0"/>
               </a:rPr>
@@ -6167,38 +6257,130 @@
               <a:buNone/>
             </a:pPr>
             <a:r>
-              <a:rPr lang="nl-BE" sz="2400">
+              <a:rPr lang="nl-BE" sz="2400" dirty="0">
                 <a:latin typeface="Consolas" panose="020B0609020204030204" pitchFamily="49" charset="0"/>
                 <a:cs typeface="Courier New" panose="02070309020205020404" pitchFamily="49" charset="0"/>
               </a:rPr>
-              <a:t>        actions for that one element of the group</a:t>
-            </a:r>
+              <a:t>        actions </a:t>
+            </a:r>
+            <a:r>
+              <a:rPr lang="nl-BE" sz="2400" dirty="0" err="1">
+                <a:latin typeface="Consolas" panose="020B0609020204030204" pitchFamily="49" charset="0"/>
+                <a:cs typeface="Courier New" panose="02070309020205020404" pitchFamily="49" charset="0"/>
+              </a:rPr>
+              <a:t>for</a:t>
+            </a:r>
+            <a:r>
+              <a:rPr lang="nl-BE" sz="2400" dirty="0">
+                <a:latin typeface="Consolas" panose="020B0609020204030204" pitchFamily="49" charset="0"/>
+                <a:cs typeface="Courier New" panose="02070309020205020404" pitchFamily="49" charset="0"/>
+              </a:rPr>
+              <a:t> </a:t>
+            </a:r>
+            <a:r>
+              <a:rPr lang="nl-BE" sz="2400" dirty="0" err="1">
+                <a:latin typeface="Consolas" panose="020B0609020204030204" pitchFamily="49" charset="0"/>
+                <a:cs typeface="Courier New" panose="02070309020205020404" pitchFamily="49" charset="0"/>
+              </a:rPr>
+              <a:t>that</a:t>
+            </a:r>
+            <a:r>
+              <a:rPr lang="nl-BE" sz="2400" dirty="0">
+                <a:latin typeface="Consolas" panose="020B0609020204030204" pitchFamily="49" charset="0"/>
+                <a:cs typeface="Courier New" panose="02070309020205020404" pitchFamily="49" charset="0"/>
+              </a:rPr>
+              <a:t> </a:t>
+            </a:r>
+            <a:r>
+              <a:rPr lang="nl-BE" sz="2400" dirty="0" err="1">
+                <a:latin typeface="Consolas" panose="020B0609020204030204" pitchFamily="49" charset="0"/>
+                <a:cs typeface="Courier New" panose="02070309020205020404" pitchFamily="49" charset="0"/>
+              </a:rPr>
+              <a:t>one</a:t>
+            </a:r>
+            <a:r>
+              <a:rPr lang="nl-BE" sz="2400" dirty="0">
+                <a:latin typeface="Consolas" panose="020B0609020204030204" pitchFamily="49" charset="0"/>
+                <a:cs typeface="Courier New" panose="02070309020205020404" pitchFamily="49" charset="0"/>
+              </a:rPr>
+              <a:t> element of </a:t>
+            </a:r>
+            <a:r>
+              <a:rPr lang="nl-BE" sz="2400" dirty="0" err="1">
+                <a:latin typeface="Consolas" panose="020B0609020204030204" pitchFamily="49" charset="0"/>
+                <a:cs typeface="Courier New" panose="02070309020205020404" pitchFamily="49" charset="0"/>
+              </a:rPr>
+              <a:t>the</a:t>
+            </a:r>
+            <a:r>
+              <a:rPr lang="nl-BE" sz="2400" dirty="0">
+                <a:latin typeface="Consolas" panose="020B0609020204030204" pitchFamily="49" charset="0"/>
+                <a:cs typeface="Courier New" panose="02070309020205020404" pitchFamily="49" charset="0"/>
+              </a:rPr>
+              <a:t> </a:t>
+            </a:r>
+            <a:r>
+              <a:rPr lang="nl-BE" sz="2400" dirty="0" err="1">
+                <a:latin typeface="Consolas" panose="020B0609020204030204" pitchFamily="49" charset="0"/>
+                <a:cs typeface="Courier New" panose="02070309020205020404" pitchFamily="49" charset="0"/>
+              </a:rPr>
+              <a:t>group</a:t>
+            </a:r>
+            <a:endParaRPr lang="nl-BE" sz="2400" dirty="0">
+              <a:latin typeface="Consolas" panose="020B0609020204030204" pitchFamily="49" charset="0"/>
+              <a:cs typeface="Courier New" panose="02070309020205020404" pitchFamily="49" charset="0"/>
+            </a:endParaRPr>
           </a:p>
           <a:p>
             <a:pPr marL="0" indent="0">
               <a:buNone/>
             </a:pPr>
             <a:r>
-              <a:rPr lang="nl-BE" sz="2400">
+              <a:rPr lang="nl-BE" sz="2400" dirty="0">
                 <a:latin typeface="Consolas" panose="020B0609020204030204" pitchFamily="49" charset="0"/>
                 <a:cs typeface="Courier New" panose="02070309020205020404" pitchFamily="49" charset="0"/>
               </a:rPr>
-              <a:t>        take next element of the group</a:t>
-            </a:r>
+              <a:t>        take next element of </a:t>
+            </a:r>
+            <a:r>
+              <a:rPr lang="nl-BE" sz="2400" dirty="0" err="1">
+                <a:latin typeface="Consolas" panose="020B0609020204030204" pitchFamily="49" charset="0"/>
+                <a:cs typeface="Courier New" panose="02070309020205020404" pitchFamily="49" charset="0"/>
+              </a:rPr>
+              <a:t>the</a:t>
+            </a:r>
+            <a:r>
+              <a:rPr lang="nl-BE" sz="2400" dirty="0">
+                <a:latin typeface="Consolas" panose="020B0609020204030204" pitchFamily="49" charset="0"/>
+                <a:cs typeface="Courier New" panose="02070309020205020404" pitchFamily="49" charset="0"/>
+              </a:rPr>
+              <a:t> </a:t>
+            </a:r>
+            <a:r>
+              <a:rPr lang="nl-BE" sz="2400" dirty="0" err="1">
+                <a:latin typeface="Consolas" panose="020B0609020204030204" pitchFamily="49" charset="0"/>
+                <a:cs typeface="Courier New" panose="02070309020205020404" pitchFamily="49" charset="0"/>
+              </a:rPr>
+              <a:t>group</a:t>
+            </a:r>
+            <a:endParaRPr lang="nl-BE" sz="2400" dirty="0">
+              <a:latin typeface="Consolas" panose="020B0609020204030204" pitchFamily="49" charset="0"/>
+              <a:cs typeface="Courier New" panose="02070309020205020404" pitchFamily="49" charset="0"/>
+            </a:endParaRPr>
           </a:p>
           <a:p>
             <a:pPr marL="0" indent="0">
               <a:buNone/>
             </a:pPr>
             <a:r>
-              <a:rPr lang="nl-BE" sz="2400">
+              <a:rPr lang="nl-BE" sz="2400" dirty="0">
                 <a:latin typeface="Consolas" panose="020B0609020204030204" pitchFamily="49" charset="0"/>
                 <a:cs typeface="Courier New" panose="02070309020205020404" pitchFamily="49" charset="0"/>
               </a:rPr>
               <a:t>    </a:t>
             </a:r>
             <a:r>
-              <a:rPr lang="nl-BE" sz="2400" err="1">
+              <a:rPr lang="nl-BE" sz="2400" dirty="0" err="1">
                 <a:solidFill>
                   <a:srgbClr val="4584B6"/>
                 </a:solidFill>
@@ -6208,14 +6390,14 @@
               <a:t>group</a:t>
             </a:r>
             <a:r>
-              <a:rPr lang="nl-BE" sz="2400">
+              <a:rPr lang="nl-BE" sz="2400" dirty="0">
                 <a:latin typeface="Consolas" panose="020B0609020204030204" pitchFamily="49" charset="0"/>
                 <a:cs typeface="Courier New" panose="02070309020205020404" pitchFamily="49" charset="0"/>
               </a:rPr>
               <a:t> </a:t>
             </a:r>
             <a:r>
-              <a:rPr lang="nl-BE" sz="2400" err="1">
+              <a:rPr lang="nl-BE" sz="2400" dirty="0" err="1">
                 <a:solidFill>
                   <a:srgbClr val="4584B6"/>
                 </a:solidFill>
@@ -6225,7 +6407,7 @@
               <a:t>final</a:t>
             </a:r>
             <a:r>
-              <a:rPr lang="nl-BE" sz="2400">
+              <a:rPr lang="nl-BE" sz="2400" dirty="0">
                 <a:solidFill>
                   <a:srgbClr val="4584B6"/>
                 </a:solidFill>
@@ -6235,7 +6417,7 @@
               <a:t> </a:t>
             </a:r>
             <a:r>
-              <a:rPr lang="nl-BE" sz="2400" err="1">
+              <a:rPr lang="nl-BE" sz="2400" dirty="0" err="1">
                 <a:solidFill>
                   <a:srgbClr val="4584B6"/>
                 </a:solidFill>
@@ -6244,7 +6426,7 @@
               </a:rPr>
               <a:t>instructions</a:t>
             </a:r>
-            <a:endParaRPr lang="nl-BE" sz="2400">
+            <a:endParaRPr lang="nl-BE" sz="2400" dirty="0">
               <a:solidFill>
                 <a:srgbClr val="4584B6"/>
               </a:solidFill>
@@ -6256,7 +6438,7 @@
             <a:pPr marL="0" indent="0">
               <a:buNone/>
             </a:pPr>
-            <a:endParaRPr lang="nl-BE" sz="2400">
+            <a:endParaRPr lang="nl-BE" sz="2400" dirty="0">
               <a:latin typeface="Consolas" panose="020B0609020204030204" pitchFamily="49" charset="0"/>
               <a:cs typeface="Courier New" panose="02070309020205020404" pitchFamily="49" charset="0"/>
             </a:endParaRPr>
@@ -6266,7 +6448,7 @@
               <a:buNone/>
             </a:pPr>
             <a:r>
-              <a:rPr lang="nl-BE" sz="2400">
+              <a:rPr lang="nl-BE" sz="2400" dirty="0">
                 <a:solidFill>
                   <a:srgbClr val="FF0000"/>
                 </a:solidFill>
@@ -6276,14 +6458,14 @@
               <a:t>program</a:t>
             </a:r>
             <a:r>
-              <a:rPr lang="nl-BE" sz="2400">
+              <a:rPr lang="nl-BE" sz="2400" dirty="0">
                 <a:latin typeface="Consolas" panose="020B0609020204030204" pitchFamily="49" charset="0"/>
                 <a:cs typeface="Courier New" panose="02070309020205020404" pitchFamily="49" charset="0"/>
               </a:rPr>
               <a:t> </a:t>
             </a:r>
             <a:r>
-              <a:rPr lang="nl-BE" sz="2400" err="1">
+              <a:rPr lang="nl-BE" sz="2400" dirty="0" err="1">
                 <a:solidFill>
                   <a:srgbClr val="FF0000"/>
                 </a:solidFill>
@@ -6293,7 +6475,7 @@
               <a:t>final</a:t>
             </a:r>
             <a:r>
-              <a:rPr lang="nl-BE" sz="2400">
+              <a:rPr lang="nl-BE" sz="2400" dirty="0">
                 <a:solidFill>
                   <a:srgbClr val="FF0000"/>
                 </a:solidFill>
@@ -6303,7 +6485,7 @@
               <a:t> </a:t>
             </a:r>
             <a:r>
-              <a:rPr lang="nl-BE" sz="2400" err="1">
+              <a:rPr lang="nl-BE" sz="2400" dirty="0" err="1">
                 <a:solidFill>
                   <a:srgbClr val="FF0000"/>
                 </a:solidFill>
@@ -6312,7 +6494,7 @@
               </a:rPr>
               <a:t>instructions</a:t>
             </a:r>
-            <a:endParaRPr lang="nl-BE" sz="2400">
+            <a:endParaRPr lang="nl-BE" sz="2400" dirty="0">
               <a:solidFill>
                 <a:srgbClr val="FF0000"/>
               </a:solidFill>
@@ -8671,7 +8853,7 @@
                 </a:spcAft>
               </a:pPr>
               <a:r>
-                <a:rPr lang="en-GB" kern="1200">
+                <a:rPr lang="en-GB" kern="1200" dirty="0">
                   <a:solidFill>
                     <a:srgbClr val="FF0000"/>
                   </a:solidFill>
@@ -8683,7 +8865,7 @@
                 <a:t>program</a:t>
               </a:r>
               <a:r>
-                <a:rPr lang="en-GB" kern="1200">
+                <a:rPr lang="en-GB" kern="1200" dirty="0">
                   <a:solidFill>
                     <a:srgbClr val="000000"/>
                   </a:solidFill>
@@ -8695,7 +8877,7 @@
                 <a:t> </a:t>
               </a:r>
               <a:r>
-                <a:rPr lang="en-GB" kern="1200">
+                <a:rPr lang="en-GB" kern="1200" dirty="0">
                   <a:solidFill>
                     <a:srgbClr val="FF0000"/>
                   </a:solidFill>
@@ -8706,7 +8888,7 @@
                 </a:rPr>
                 <a:t>start instructions</a:t>
               </a:r>
-              <a:endParaRPr lang="nl-BE">
+              <a:endParaRPr lang="nl-BE" dirty="0">
                 <a:effectLst/>
                 <a:latin typeface="Consolas" panose="020B0609020204030204" pitchFamily="49" charset="0"/>
                 <a:ea typeface="Calibri" panose="020F0502020204030204" pitchFamily="34" charset="0"/>
@@ -8722,7 +8904,7 @@
                   <a:spcPts val="800"/>
                 </a:spcAft>
               </a:pPr>
-              <a:endParaRPr lang="en-GB" kern="1200">
+              <a:endParaRPr lang="en-GB" kern="1200" dirty="0">
                 <a:solidFill>
                   <a:srgbClr val="000000"/>
                 </a:solidFill>
@@ -8741,7 +8923,7 @@
                   <a:spcPts val="800"/>
                 </a:spcAft>
               </a:pPr>
-              <a:endParaRPr lang="en-GB">
+              <a:endParaRPr lang="en-GB" dirty="0">
                 <a:solidFill>
                   <a:srgbClr val="000000"/>
                 </a:solidFill>
@@ -8760,7 +8942,7 @@
                 </a:spcAft>
               </a:pPr>
               <a:r>
-                <a:rPr lang="en-GB" kern="1200">
+                <a:rPr lang="en-GB" kern="1200" dirty="0">
                   <a:solidFill>
                     <a:srgbClr val="000000"/>
                   </a:solidFill>
@@ -8772,7 +8954,7 @@
                 <a:t>while </a:t>
               </a:r>
               <a:r>
-                <a:rPr lang="en-GB" kern="1200" err="1">
+                <a:rPr lang="en-GB" kern="1200" dirty="0" err="1">
                   <a:solidFill>
                     <a:srgbClr val="000000"/>
                   </a:solidFill>
@@ -8784,7 +8966,7 @@
                 <a:t>not_end_data</a:t>
               </a:r>
               <a:r>
-                <a:rPr lang="en-GB" kern="1200">
+                <a:rPr lang="en-GB" kern="1200" dirty="0">
                   <a:solidFill>
                     <a:srgbClr val="000000"/>
                   </a:solidFill>
@@ -8795,7 +8977,7 @@
                 </a:rPr>
                 <a:t>:</a:t>
               </a:r>
-              <a:endParaRPr lang="nl-BE">
+              <a:endParaRPr lang="nl-BE" dirty="0">
                 <a:effectLst/>
                 <a:latin typeface="Consolas" panose="020B0609020204030204" pitchFamily="49" charset="0"/>
                 <a:ea typeface="Calibri" panose="020F0502020204030204" pitchFamily="34" charset="0"/>
@@ -8811,7 +8993,7 @@
                   <a:spcPts val="800"/>
                 </a:spcAft>
               </a:pPr>
-              <a:endParaRPr lang="en-GB" sz="900" kern="1200">
+              <a:endParaRPr lang="en-GB" sz="900" kern="1200" dirty="0">
                 <a:solidFill>
                   <a:srgbClr val="000000"/>
                 </a:solidFill>
@@ -8831,7 +9013,7 @@
                 </a:spcAft>
               </a:pPr>
               <a:r>
-                <a:rPr lang="en-GB" kern="1200">
+                <a:rPr lang="en-GB" kern="1200" dirty="0">
                   <a:solidFill>
                     <a:srgbClr val="000000"/>
                   </a:solidFill>
@@ -8843,7 +9025,7 @@
                 <a:t>    </a:t>
               </a:r>
               <a:r>
-                <a:rPr lang="en-GB" kern="1200">
+                <a:rPr lang="en-GB" kern="1200" dirty="0">
                   <a:solidFill>
                     <a:srgbClr val="4584B6"/>
                   </a:solidFill>
@@ -8854,7 +9036,7 @@
                 </a:rPr>
                 <a:t>group start instructions</a:t>
               </a:r>
-              <a:endParaRPr lang="nl-BE">
+              <a:endParaRPr lang="nl-BE" dirty="0">
                 <a:effectLst/>
                 <a:latin typeface="Consolas" panose="020B0609020204030204" pitchFamily="49" charset="0"/>
                 <a:ea typeface="Calibri" panose="020F0502020204030204" pitchFamily="34" charset="0"/>
@@ -8870,7 +9052,7 @@
                   <a:spcPts val="800"/>
                 </a:spcAft>
               </a:pPr>
-              <a:endParaRPr lang="en-GB" sz="700" kern="1200">
+              <a:endParaRPr lang="en-GB" sz="700" kern="1200" dirty="0">
                 <a:solidFill>
                   <a:srgbClr val="000000"/>
                 </a:solidFill>
@@ -8887,7 +9069,7 @@
                 </a:lnSpc>
               </a:pPr>
               <a:r>
-                <a:rPr lang="en-GB" kern="1200">
+                <a:rPr lang="en-GB" kern="1200" dirty="0">
                   <a:solidFill>
                     <a:srgbClr val="000000"/>
                   </a:solidFill>
@@ -8899,7 +9081,7 @@
                 <a:t>    while </a:t>
               </a:r>
               <a:r>
-                <a:rPr lang="en-GB" kern="1200" err="1">
+                <a:rPr lang="en-GB" kern="1200" dirty="0" err="1">
                   <a:solidFill>
                     <a:srgbClr val="000000"/>
                   </a:solidFill>
@@ -8911,7 +9093,7 @@
                 <a:t>not_end_data</a:t>
               </a:r>
               <a:r>
-                <a:rPr lang="en-GB" kern="1200">
+                <a:rPr lang="en-GB" kern="1200" dirty="0">
                   <a:solidFill>
                     <a:srgbClr val="000000"/>
                   </a:solidFill>
@@ -8922,7 +9104,7 @@
                 </a:rPr>
                 <a:t> and</a:t>
               </a:r>
-              <a:endParaRPr lang="nl-BE">
+              <a:endParaRPr lang="nl-BE" dirty="0">
                 <a:effectLst/>
                 <a:latin typeface="Consolas" panose="020B0609020204030204" pitchFamily="49" charset="0"/>
                 <a:ea typeface="Calibri" panose="020F0502020204030204" pitchFamily="34" charset="0"/>
@@ -8936,7 +9118,7 @@
                 </a:lnSpc>
               </a:pPr>
               <a:r>
-                <a:rPr lang="en-GB" kern="1200" err="1">
+                <a:rPr lang="en-GB" kern="1200" dirty="0" err="1">
                   <a:solidFill>
                     <a:srgbClr val="000000"/>
                   </a:solidFill>
@@ -8948,19 +9130,18 @@
                 <a:t>in_the</a:t>
               </a:r>
               <a:r>
-                <a:rPr lang="en-GB" kern="1200">
+                <a:rPr lang="en-GB" dirty="0" err="1">
                   <a:solidFill>
                     <a:srgbClr val="000000"/>
                   </a:solidFill>
-                  <a:effectLst/>
                   <a:latin typeface="Consolas" panose="020B0609020204030204" pitchFamily="49" charset="0"/>
                   <a:ea typeface="Calibri" panose="020F0502020204030204" pitchFamily="34" charset="0"/>
                   <a:cs typeface="Courier New" panose="02070309020205020404" pitchFamily="49" charset="0"/>
                 </a:rPr>
-                <a:t> </a:t>
+                <a:t>_</a:t>
               </a:r>
               <a:r>
-                <a:rPr lang="en-GB" kern="1200" err="1">
+                <a:rPr lang="en-GB" kern="1200" dirty="0" err="1">
                   <a:solidFill>
                     <a:srgbClr val="000000"/>
                   </a:solidFill>
@@ -8972,7 +9153,7 @@
                 <a:t>same_group</a:t>
               </a:r>
               <a:r>
-                <a:rPr lang="en-GB" kern="1200">
+                <a:rPr lang="en-GB" kern="1200" dirty="0">
                   <a:solidFill>
                     <a:srgbClr val="000000"/>
                   </a:solidFill>
@@ -8983,7 +9164,7 @@
                 </a:rPr>
                 <a:t>:</a:t>
               </a:r>
-              <a:endParaRPr lang="nl-BE">
+              <a:endParaRPr lang="nl-BE" dirty="0">
                 <a:effectLst/>
                 <a:latin typeface="Consolas" panose="020B0609020204030204" pitchFamily="49" charset="0"/>
                 <a:ea typeface="Calibri" panose="020F0502020204030204" pitchFamily="34" charset="0"/>
@@ -8999,7 +9180,7 @@
                   <a:spcPts val="800"/>
                 </a:spcAft>
               </a:pPr>
-              <a:endParaRPr lang="en-GB" sz="1000" kern="1200">
+              <a:endParaRPr lang="en-GB" sz="1000" kern="1200" dirty="0">
                 <a:solidFill>
                   <a:srgbClr val="000000"/>
                 </a:solidFill>
@@ -9019,7 +9200,7 @@
                 </a:spcAft>
               </a:pPr>
               <a:r>
-                <a:rPr lang="en-GB" kern="1200">
+                <a:rPr lang="en-GB" kern="1200" dirty="0">
                   <a:solidFill>
                     <a:srgbClr val="000000"/>
                   </a:solidFill>
@@ -9030,7 +9211,7 @@
                 </a:rPr>
                 <a:t>        actions </a:t>
               </a:r>
-              <a:endParaRPr lang="nl-BE">
+              <a:endParaRPr lang="nl-BE" dirty="0">
                 <a:effectLst/>
                 <a:latin typeface="Consolas" panose="020B0609020204030204" pitchFamily="49" charset="0"/>
                 <a:ea typeface="Calibri" panose="020F0502020204030204" pitchFamily="34" charset="0"/>
@@ -9046,7 +9227,7 @@
                   <a:spcPts val="800"/>
                 </a:spcAft>
               </a:pPr>
-              <a:endParaRPr lang="en-GB" sz="500" kern="1200">
+              <a:endParaRPr lang="en-GB" sz="500" kern="1200" dirty="0">
                 <a:solidFill>
                   <a:srgbClr val="000000"/>
                 </a:solidFill>
@@ -9066,7 +9247,7 @@
                 </a:spcAft>
               </a:pPr>
               <a:r>
-                <a:rPr lang="en-GB" kern="1200">
+                <a:rPr lang="en-GB" kern="1200" dirty="0">
                   <a:solidFill>
                     <a:srgbClr val="000000"/>
                   </a:solidFill>
@@ -9078,7 +9259,7 @@
                 <a:t>    </a:t>
               </a:r>
               <a:r>
-                <a:rPr lang="en-GB" kern="1200">
+                <a:rPr lang="en-GB" kern="1200" dirty="0">
                   <a:solidFill>
                     <a:srgbClr val="4584B6"/>
                   </a:solidFill>
@@ -9090,7 +9271,7 @@
                 <a:t>group</a:t>
               </a:r>
               <a:r>
-                <a:rPr lang="en-GB" kern="1200">
+                <a:rPr lang="en-GB" kern="1200" dirty="0">
                   <a:solidFill>
                     <a:srgbClr val="000000"/>
                   </a:solidFill>
@@ -9102,7 +9283,7 @@
                 <a:t> </a:t>
               </a:r>
               <a:r>
-                <a:rPr lang="en-GB" kern="1200">
+                <a:rPr lang="en-GB" kern="1200" dirty="0">
                   <a:solidFill>
                     <a:srgbClr val="4584B6"/>
                   </a:solidFill>
@@ -9113,7 +9294,7 @@
                 </a:rPr>
                 <a:t>final instructions</a:t>
               </a:r>
-              <a:endParaRPr lang="nl-BE">
+              <a:endParaRPr lang="nl-BE" dirty="0">
                 <a:effectLst/>
                 <a:latin typeface="Consolas" panose="020B0609020204030204" pitchFamily="49" charset="0"/>
                 <a:ea typeface="Calibri" panose="020F0502020204030204" pitchFamily="34" charset="0"/>
@@ -9130,7 +9311,7 @@
                 </a:spcAft>
               </a:pPr>
               <a:r>
-                <a:rPr lang="en-GB" kern="1200">
+                <a:rPr lang="en-GB" kern="1200" dirty="0">
                   <a:solidFill>
                     <a:srgbClr val="FF0000"/>
                   </a:solidFill>
@@ -9142,7 +9323,7 @@
                 <a:t>program</a:t>
               </a:r>
               <a:r>
-                <a:rPr lang="en-GB" kern="1200">
+                <a:rPr lang="en-GB" kern="1200" dirty="0">
                   <a:solidFill>
                     <a:srgbClr val="000000"/>
                   </a:solidFill>
@@ -9154,7 +9335,7 @@
                 <a:t> </a:t>
               </a:r>
               <a:r>
-                <a:rPr lang="en-GB" kern="1200">
+                <a:rPr lang="en-GB" kern="1200" dirty="0">
                   <a:solidFill>
                     <a:srgbClr val="FF0000"/>
                   </a:solidFill>
@@ -9165,7 +9346,7 @@
                 </a:rPr>
                 <a:t>final instructions</a:t>
               </a:r>
-              <a:endParaRPr lang="nl-BE">
+              <a:endParaRPr lang="nl-BE" dirty="0">
                 <a:effectLst/>
                 <a:latin typeface="Consolas" panose="020B0609020204030204" pitchFamily="49" charset="0"/>
                 <a:ea typeface="Calibri" panose="020F0502020204030204" pitchFamily="34" charset="0"/>
@@ -11259,7 +11440,7 @@
               </a:spcAft>
             </a:pPr>
             <a:r>
-              <a:rPr lang="en-GB" sz="1600" kern="1200">
+              <a:rPr lang="en-GB" sz="1600" kern="1200" dirty="0">
                 <a:solidFill>
                   <a:srgbClr val="FF0000"/>
                 </a:solidFill>
@@ -11271,7 +11452,7 @@
               <a:t>program</a:t>
             </a:r>
             <a:r>
-              <a:rPr lang="en-GB" sz="1600" kern="1200">
+              <a:rPr lang="en-GB" sz="1600" kern="1200" dirty="0">
                 <a:solidFill>
                   <a:srgbClr val="000000"/>
                 </a:solidFill>
@@ -11283,7 +11464,7 @@
               <a:t> </a:t>
             </a:r>
             <a:r>
-              <a:rPr lang="en-GB" sz="1600" kern="1200">
+              <a:rPr lang="en-GB" sz="1600" kern="1200" dirty="0">
                 <a:solidFill>
                   <a:srgbClr val="FF0000"/>
                 </a:solidFill>
@@ -11294,7 +11475,7 @@
               </a:rPr>
               <a:t>start instructions</a:t>
             </a:r>
-            <a:endParaRPr lang="nl-BE" sz="1100">
+            <a:endParaRPr lang="nl-BE" sz="1100" dirty="0">
               <a:effectLst/>
               <a:latin typeface="Calibri" panose="020F0502020204030204" pitchFamily="34" charset="0"/>
               <a:ea typeface="Calibri" panose="020F0502020204030204" pitchFamily="34" charset="0"/>
@@ -11310,7 +11491,7 @@
                 <a:spcPts val="800"/>
               </a:spcAft>
             </a:pPr>
-            <a:endParaRPr lang="en-GB" sz="1600" kern="1200">
+            <a:endParaRPr lang="en-GB" sz="1600" kern="1200" dirty="0">
               <a:solidFill>
                 <a:srgbClr val="000000"/>
               </a:solidFill>
@@ -11329,7 +11510,7 @@
                 <a:spcPts val="800"/>
               </a:spcAft>
             </a:pPr>
-            <a:endParaRPr lang="en-GB" sz="1600">
+            <a:endParaRPr lang="en-GB" sz="1600" dirty="0">
               <a:solidFill>
                 <a:srgbClr val="000000"/>
               </a:solidFill>
@@ -11348,7 +11529,7 @@
               </a:spcAft>
             </a:pPr>
             <a:r>
-              <a:rPr lang="en-GB" sz="1600" kern="1200">
+              <a:rPr lang="en-GB" sz="1600" kern="1200" dirty="0">
                 <a:solidFill>
                   <a:srgbClr val="000000"/>
                 </a:solidFill>
@@ -11360,7 +11541,7 @@
               <a:t>while </a:t>
             </a:r>
             <a:r>
-              <a:rPr lang="en-GB" sz="1600" kern="1200" err="1">
+              <a:rPr lang="en-GB" sz="1600" kern="1200" dirty="0" err="1">
                 <a:solidFill>
                   <a:srgbClr val="000000"/>
                 </a:solidFill>
@@ -11372,7 +11553,7 @@
               <a:t>not_end_data</a:t>
             </a:r>
             <a:r>
-              <a:rPr lang="en-GB" sz="1600" kern="1200">
+              <a:rPr lang="en-GB" sz="1600" kern="1200" dirty="0">
                 <a:solidFill>
                   <a:srgbClr val="000000"/>
                 </a:solidFill>
@@ -11383,7 +11564,7 @@
               </a:rPr>
               <a:t>:</a:t>
             </a:r>
-            <a:endParaRPr lang="nl-BE" sz="1100">
+            <a:endParaRPr lang="nl-BE" sz="1100" dirty="0">
               <a:effectLst/>
               <a:latin typeface="Calibri" panose="020F0502020204030204" pitchFamily="34" charset="0"/>
               <a:ea typeface="Calibri" panose="020F0502020204030204" pitchFamily="34" charset="0"/>
@@ -11399,7 +11580,7 @@
                 <a:spcPts val="800"/>
               </a:spcAft>
             </a:pPr>
-            <a:endParaRPr lang="en-GB" sz="1600" kern="1200">
+            <a:endParaRPr lang="en-GB" sz="1600" kern="1200" dirty="0">
               <a:solidFill>
                 <a:srgbClr val="000000"/>
               </a:solidFill>
@@ -11419,7 +11600,7 @@
               </a:spcAft>
             </a:pPr>
             <a:r>
-              <a:rPr lang="en-GB" sz="1600" kern="1200">
+              <a:rPr lang="en-GB" sz="1600" kern="1200" dirty="0">
                 <a:solidFill>
                   <a:srgbClr val="000000"/>
                 </a:solidFill>
@@ -11431,7 +11612,7 @@
               <a:t>    </a:t>
             </a:r>
             <a:r>
-              <a:rPr lang="en-GB" sz="1600" kern="1200">
+              <a:rPr lang="en-GB" sz="1600" kern="1200" dirty="0">
                 <a:solidFill>
                   <a:srgbClr val="4584B6"/>
                 </a:solidFill>
@@ -11442,7 +11623,7 @@
               </a:rPr>
               <a:t>group start instructions</a:t>
             </a:r>
-            <a:endParaRPr lang="nl-BE" sz="1100">
+            <a:endParaRPr lang="nl-BE" sz="1100" dirty="0">
               <a:effectLst/>
               <a:latin typeface="Calibri" panose="020F0502020204030204" pitchFamily="34" charset="0"/>
               <a:ea typeface="Calibri" panose="020F0502020204030204" pitchFamily="34" charset="0"/>
@@ -11458,7 +11639,7 @@
                 <a:spcPts val="800"/>
               </a:spcAft>
             </a:pPr>
-            <a:endParaRPr lang="en-GB" sz="1600" kern="1200">
+            <a:endParaRPr lang="en-GB" sz="1600" kern="1200" dirty="0">
               <a:solidFill>
                 <a:srgbClr val="000000"/>
               </a:solidFill>
@@ -11478,7 +11659,7 @@
               </a:spcAft>
             </a:pPr>
             <a:r>
-              <a:rPr lang="en-GB" sz="1600" kern="1200">
+              <a:rPr lang="en-GB" sz="1600" kern="1200" dirty="0">
                 <a:solidFill>
                   <a:srgbClr val="000000"/>
                 </a:solidFill>
@@ -11490,7 +11671,7 @@
               <a:t>    while </a:t>
             </a:r>
             <a:r>
-              <a:rPr lang="en-GB" sz="1600" kern="1200" err="1">
+              <a:rPr lang="en-GB" sz="1600" kern="1200" dirty="0" err="1">
                 <a:solidFill>
                   <a:srgbClr val="000000"/>
                 </a:solidFill>
@@ -11502,7 +11683,7 @@
               <a:t>not_end_data</a:t>
             </a:r>
             <a:r>
-              <a:rPr lang="en-GB" sz="1600" kern="1200">
+              <a:rPr lang="en-GB" sz="1600" kern="1200" dirty="0">
                 <a:solidFill>
                   <a:srgbClr val="000000"/>
                 </a:solidFill>
@@ -11513,7 +11694,7 @@
               </a:rPr>
               <a:t> and</a:t>
             </a:r>
-            <a:endParaRPr lang="nl-BE" sz="1100">
+            <a:endParaRPr lang="nl-BE" sz="1100" dirty="0">
               <a:effectLst/>
               <a:latin typeface="Calibri" panose="020F0502020204030204" pitchFamily="34" charset="0"/>
               <a:ea typeface="Calibri" panose="020F0502020204030204" pitchFamily="34" charset="0"/>
@@ -11530,7 +11711,7 @@
               </a:spcAft>
             </a:pPr>
             <a:r>
-              <a:rPr lang="en-GB" sz="1600" kern="1200" err="1">
+              <a:rPr lang="en-GB" sz="1600" kern="1200" dirty="0" err="1">
                 <a:solidFill>
                   <a:srgbClr val="000000"/>
                 </a:solidFill>
@@ -11542,19 +11723,18 @@
               <a:t>in_the</a:t>
             </a:r>
             <a:r>
-              <a:rPr lang="en-GB" sz="1600" kern="1200">
-                <a:solidFill>
-                  <a:srgbClr val="000000"/>
-                </a:solidFill>
-                <a:effectLst/>
+              <a:rPr lang="en-GB" sz="1600" dirty="0" err="1">
+                <a:solidFill>
+                  <a:srgbClr val="000000"/>
+                </a:solidFill>
                 <a:latin typeface="Consolas" panose="020B0609020204030204" pitchFamily="49" charset="0"/>
                 <a:ea typeface="Calibri" panose="020F0502020204030204" pitchFamily="34" charset="0"/>
                 <a:cs typeface="Courier New" panose="02070309020205020404" pitchFamily="49" charset="0"/>
               </a:rPr>
-              <a:t> </a:t>
-            </a:r>
-            <a:r>
-              <a:rPr lang="en-GB" sz="1600" kern="1200" err="1">
+              <a:t>_</a:t>
+            </a:r>
+            <a:r>
+              <a:rPr lang="en-GB" sz="1600" kern="1200" dirty="0" err="1">
                 <a:solidFill>
                   <a:srgbClr val="000000"/>
                 </a:solidFill>
@@ -11566,7 +11746,7 @@
               <a:t>same_group</a:t>
             </a:r>
             <a:r>
-              <a:rPr lang="en-GB" sz="1600" kern="1200">
+              <a:rPr lang="en-GB" sz="1600" kern="1200" dirty="0">
                 <a:solidFill>
                   <a:srgbClr val="000000"/>
                 </a:solidFill>
@@ -11577,7 +11757,7 @@
               </a:rPr>
               <a:t>:</a:t>
             </a:r>
-            <a:endParaRPr lang="nl-BE" sz="1100">
+            <a:endParaRPr lang="nl-BE" sz="1100" dirty="0">
               <a:effectLst/>
               <a:latin typeface="Calibri" panose="020F0502020204030204" pitchFamily="34" charset="0"/>
               <a:ea typeface="Calibri" panose="020F0502020204030204" pitchFamily="34" charset="0"/>
@@ -11594,7 +11774,7 @@
               </a:spcAft>
             </a:pPr>
             <a:r>
-              <a:rPr lang="en-GB" sz="1600" kern="1200">
+              <a:rPr lang="en-GB" sz="1600" kern="1200" dirty="0">
                 <a:solidFill>
                   <a:srgbClr val="000000"/>
                 </a:solidFill>
@@ -11605,7 +11785,7 @@
               </a:rPr>
               <a:t>        actions </a:t>
             </a:r>
-            <a:endParaRPr lang="nl-BE" sz="1100">
+            <a:endParaRPr lang="nl-BE" sz="1100" dirty="0">
               <a:effectLst/>
               <a:latin typeface="Calibri" panose="020F0502020204030204" pitchFamily="34" charset="0"/>
               <a:ea typeface="Calibri" panose="020F0502020204030204" pitchFamily="34" charset="0"/>
@@ -11622,7 +11802,7 @@
               </a:spcAft>
             </a:pPr>
             <a:r>
-              <a:rPr lang="en-GB" sz="1600" kern="1200">
+              <a:rPr lang="en-GB" sz="1600" kern="1200" dirty="0">
                 <a:solidFill>
                   <a:srgbClr val="000000"/>
                 </a:solidFill>
@@ -11634,7 +11814,7 @@
               <a:t>    </a:t>
             </a:r>
             <a:r>
-              <a:rPr lang="en-GB" sz="1600" kern="1200">
+              <a:rPr lang="en-GB" sz="1600" kern="1200" dirty="0">
                 <a:solidFill>
                   <a:srgbClr val="4584B6"/>
                 </a:solidFill>
@@ -11646,7 +11826,7 @@
               <a:t>group</a:t>
             </a:r>
             <a:r>
-              <a:rPr lang="en-GB" sz="1600" kern="1200">
+              <a:rPr lang="en-GB" sz="1600" kern="1200" dirty="0">
                 <a:solidFill>
                   <a:srgbClr val="000000"/>
                 </a:solidFill>
@@ -11658,7 +11838,7 @@
               <a:t> </a:t>
             </a:r>
             <a:r>
-              <a:rPr lang="en-GB" sz="1600" kern="1200">
+              <a:rPr lang="en-GB" sz="1600" kern="1200" dirty="0">
                 <a:solidFill>
                   <a:srgbClr val="4584B6"/>
                 </a:solidFill>
@@ -11669,7 +11849,7 @@
               </a:rPr>
               <a:t>final instructions</a:t>
             </a:r>
-            <a:endParaRPr lang="nl-BE" sz="1100">
+            <a:endParaRPr lang="nl-BE" sz="1100" dirty="0">
               <a:effectLst/>
               <a:latin typeface="Calibri" panose="020F0502020204030204" pitchFamily="34" charset="0"/>
               <a:ea typeface="Calibri" panose="020F0502020204030204" pitchFamily="34" charset="0"/>
@@ -11685,7 +11865,7 @@
                 <a:spcPts val="800"/>
               </a:spcAft>
             </a:pPr>
-            <a:endParaRPr lang="en-GB" sz="1600" kern="1200">
+            <a:endParaRPr lang="en-GB" sz="1600" kern="1200" dirty="0">
               <a:solidFill>
                 <a:srgbClr val="FF0000"/>
               </a:solidFill>
@@ -11705,7 +11885,7 @@
               </a:spcAft>
             </a:pPr>
             <a:r>
-              <a:rPr lang="en-GB" sz="1600" kern="1200">
+              <a:rPr lang="en-GB" sz="1600" kern="1200" dirty="0">
                 <a:solidFill>
                   <a:srgbClr val="FF0000"/>
                 </a:solidFill>
@@ -11717,7 +11897,7 @@
               <a:t>program</a:t>
             </a:r>
             <a:r>
-              <a:rPr lang="en-GB" sz="1600" kern="1200">
+              <a:rPr lang="en-GB" sz="1600" kern="1200" dirty="0">
                 <a:solidFill>
                   <a:srgbClr val="000000"/>
                 </a:solidFill>
@@ -11729,7 +11909,7 @@
               <a:t> </a:t>
             </a:r>
             <a:r>
-              <a:rPr lang="en-GB" sz="1600" kern="1200">
+              <a:rPr lang="en-GB" sz="1600" kern="1200" dirty="0">
                 <a:solidFill>
                   <a:srgbClr val="FF0000"/>
                 </a:solidFill>
@@ -11740,7 +11920,7 @@
               </a:rPr>
               <a:t>final instructions</a:t>
             </a:r>
-            <a:endParaRPr lang="nl-BE" sz="1100">
+            <a:endParaRPr lang="nl-BE" sz="1100" dirty="0">
               <a:effectLst/>
               <a:latin typeface="Calibri" panose="020F0502020204030204" pitchFamily="34" charset="0"/>
               <a:ea typeface="Calibri" panose="020F0502020204030204" pitchFamily="34" charset="0"/>
@@ -13530,7 +13710,7 @@
               </a:spcAft>
             </a:pPr>
             <a:r>
-              <a:rPr lang="en-GB" kern="1200">
+              <a:rPr lang="en-GB" kern="1200" dirty="0">
                 <a:solidFill>
                   <a:srgbClr val="FF0000"/>
                 </a:solidFill>
@@ -13542,7 +13722,7 @@
               <a:t>program</a:t>
             </a:r>
             <a:r>
-              <a:rPr lang="en-GB" kern="1200">
+              <a:rPr lang="en-GB" kern="1200" dirty="0">
                 <a:solidFill>
                   <a:srgbClr val="000000"/>
                 </a:solidFill>
@@ -13554,7 +13734,7 @@
               <a:t> </a:t>
             </a:r>
             <a:r>
-              <a:rPr lang="en-GB" kern="1200">
+              <a:rPr lang="en-GB" kern="1200" dirty="0">
                 <a:solidFill>
                   <a:srgbClr val="FF0000"/>
                 </a:solidFill>
@@ -13565,7 +13745,7 @@
               </a:rPr>
               <a:t>start instructions</a:t>
             </a:r>
-            <a:endParaRPr lang="nl-BE">
+            <a:endParaRPr lang="nl-BE" dirty="0">
               <a:effectLst/>
               <a:latin typeface="Consolas" panose="020B0609020204030204" pitchFamily="49" charset="0"/>
               <a:ea typeface="Calibri" panose="020F0502020204030204" pitchFamily="34" charset="0"/>
@@ -13581,7 +13761,7 @@
                 <a:spcPts val="800"/>
               </a:spcAft>
             </a:pPr>
-            <a:endParaRPr lang="en-GB" kern="1200">
+            <a:endParaRPr lang="en-GB" kern="1200" dirty="0">
               <a:solidFill>
                 <a:srgbClr val="000000"/>
               </a:solidFill>
@@ -13600,7 +13780,7 @@
                 <a:spcPts val="800"/>
               </a:spcAft>
             </a:pPr>
-            <a:endParaRPr lang="en-GB">
+            <a:endParaRPr lang="en-GB" dirty="0">
               <a:solidFill>
                 <a:srgbClr val="000000"/>
               </a:solidFill>
@@ -13619,7 +13799,7 @@
               </a:spcAft>
             </a:pPr>
             <a:r>
-              <a:rPr lang="en-GB" kern="1200">
+              <a:rPr lang="en-GB" kern="1200" dirty="0">
                 <a:solidFill>
                   <a:srgbClr val="000000"/>
                 </a:solidFill>
@@ -13631,7 +13811,7 @@
               <a:t>while </a:t>
             </a:r>
             <a:r>
-              <a:rPr lang="en-GB" kern="1200" err="1">
+              <a:rPr lang="en-GB" kern="1200" dirty="0" err="1">
                 <a:solidFill>
                   <a:srgbClr val="000000"/>
                 </a:solidFill>
@@ -13643,7 +13823,7 @@
               <a:t>not_end_data</a:t>
             </a:r>
             <a:r>
-              <a:rPr lang="en-GB" kern="1200">
+              <a:rPr lang="en-GB" kern="1200" dirty="0">
                 <a:solidFill>
                   <a:srgbClr val="000000"/>
                 </a:solidFill>
@@ -13654,7 +13834,7 @@
               </a:rPr>
               <a:t>:</a:t>
             </a:r>
-            <a:endParaRPr lang="nl-BE">
+            <a:endParaRPr lang="nl-BE" dirty="0">
               <a:effectLst/>
               <a:latin typeface="Consolas" panose="020B0609020204030204" pitchFamily="49" charset="0"/>
               <a:ea typeface="Calibri" panose="020F0502020204030204" pitchFamily="34" charset="0"/>
@@ -13670,7 +13850,7 @@
                 <a:spcPts val="800"/>
               </a:spcAft>
             </a:pPr>
-            <a:endParaRPr lang="en-GB" sz="900" kern="1200">
+            <a:endParaRPr lang="en-GB" sz="900" kern="1200" dirty="0">
               <a:solidFill>
                 <a:srgbClr val="000000"/>
               </a:solidFill>
@@ -13690,7 +13870,7 @@
               </a:spcAft>
             </a:pPr>
             <a:r>
-              <a:rPr lang="en-GB" kern="1200">
+              <a:rPr lang="en-GB" kern="1200" dirty="0">
                 <a:solidFill>
                   <a:srgbClr val="000000"/>
                 </a:solidFill>
@@ -13702,7 +13882,7 @@
               <a:t>    </a:t>
             </a:r>
             <a:r>
-              <a:rPr lang="en-GB" kern="1200">
+              <a:rPr lang="en-GB" kern="1200" dirty="0">
                 <a:solidFill>
                   <a:srgbClr val="4584B6"/>
                 </a:solidFill>
@@ -13713,7 +13893,7 @@
               </a:rPr>
               <a:t>group start instructions</a:t>
             </a:r>
-            <a:endParaRPr lang="nl-BE">
+            <a:endParaRPr lang="nl-BE" dirty="0">
               <a:effectLst/>
               <a:latin typeface="Consolas" panose="020B0609020204030204" pitchFamily="49" charset="0"/>
               <a:ea typeface="Calibri" panose="020F0502020204030204" pitchFamily="34" charset="0"/>
@@ -13729,7 +13909,7 @@
                 <a:spcPts val="800"/>
               </a:spcAft>
             </a:pPr>
-            <a:endParaRPr lang="en-GB" sz="700" kern="1200">
+            <a:endParaRPr lang="en-GB" sz="700" kern="1200" dirty="0">
               <a:solidFill>
                 <a:srgbClr val="000000"/>
               </a:solidFill>
@@ -13746,7 +13926,7 @@
               </a:lnSpc>
             </a:pPr>
             <a:r>
-              <a:rPr lang="en-GB" kern="1200">
+              <a:rPr lang="en-GB" kern="1200" dirty="0">
                 <a:solidFill>
                   <a:srgbClr val="000000"/>
                 </a:solidFill>
@@ -13758,7 +13938,7 @@
               <a:t>    while </a:t>
             </a:r>
             <a:r>
-              <a:rPr lang="en-GB" kern="1200" err="1">
+              <a:rPr lang="en-GB" kern="1200" dirty="0" err="1">
                 <a:solidFill>
                   <a:srgbClr val="000000"/>
                 </a:solidFill>
@@ -13770,7 +13950,7 @@
               <a:t>not_end_data</a:t>
             </a:r>
             <a:r>
-              <a:rPr lang="en-GB" kern="1200">
+              <a:rPr lang="en-GB" kern="1200" dirty="0">
                 <a:solidFill>
                   <a:srgbClr val="000000"/>
                 </a:solidFill>
@@ -13781,7 +13961,7 @@
               </a:rPr>
               <a:t> and</a:t>
             </a:r>
-            <a:endParaRPr lang="nl-BE">
+            <a:endParaRPr lang="nl-BE" dirty="0">
               <a:effectLst/>
               <a:latin typeface="Consolas" panose="020B0609020204030204" pitchFamily="49" charset="0"/>
               <a:ea typeface="Calibri" panose="020F0502020204030204" pitchFamily="34" charset="0"/>
@@ -13795,7 +13975,7 @@
               </a:lnSpc>
             </a:pPr>
             <a:r>
-              <a:rPr lang="en-GB" kern="1200" err="1">
+              <a:rPr lang="en-GB" kern="1200" dirty="0" err="1">
                 <a:solidFill>
                   <a:srgbClr val="000000"/>
                 </a:solidFill>
@@ -13807,19 +13987,18 @@
               <a:t>in_the</a:t>
             </a:r>
             <a:r>
-              <a:rPr lang="en-GB" kern="1200">
-                <a:solidFill>
-                  <a:srgbClr val="000000"/>
-                </a:solidFill>
-                <a:effectLst/>
+              <a:rPr lang="en-GB" dirty="0" err="1">
+                <a:solidFill>
+                  <a:srgbClr val="000000"/>
+                </a:solidFill>
                 <a:latin typeface="Consolas" panose="020B0609020204030204" pitchFamily="49" charset="0"/>
                 <a:ea typeface="Calibri" panose="020F0502020204030204" pitchFamily="34" charset="0"/>
                 <a:cs typeface="Courier New" panose="02070309020205020404" pitchFamily="49" charset="0"/>
               </a:rPr>
-              <a:t> </a:t>
-            </a:r>
-            <a:r>
-              <a:rPr lang="en-GB" kern="1200" err="1">
+              <a:t>_</a:t>
+            </a:r>
+            <a:r>
+              <a:rPr lang="en-GB" kern="1200" dirty="0" err="1">
                 <a:solidFill>
                   <a:srgbClr val="000000"/>
                 </a:solidFill>
@@ -13831,7 +14010,7 @@
               <a:t>same_group</a:t>
             </a:r>
             <a:r>
-              <a:rPr lang="en-GB" kern="1200">
+              <a:rPr lang="en-GB" kern="1200" dirty="0">
                 <a:solidFill>
                   <a:srgbClr val="000000"/>
                 </a:solidFill>
@@ -13842,7 +14021,7 @@
               </a:rPr>
               <a:t>:</a:t>
             </a:r>
-            <a:endParaRPr lang="nl-BE">
+            <a:endParaRPr lang="nl-BE" dirty="0">
               <a:effectLst/>
               <a:latin typeface="Consolas" panose="020B0609020204030204" pitchFamily="49" charset="0"/>
               <a:ea typeface="Calibri" panose="020F0502020204030204" pitchFamily="34" charset="0"/>
@@ -13858,7 +14037,7 @@
                 <a:spcPts val="800"/>
               </a:spcAft>
             </a:pPr>
-            <a:endParaRPr lang="en-GB" sz="1000" kern="1200">
+            <a:endParaRPr lang="en-GB" sz="1000" kern="1200" dirty="0">
               <a:solidFill>
                 <a:srgbClr val="000000"/>
               </a:solidFill>
@@ -13878,7 +14057,7 @@
               </a:spcAft>
             </a:pPr>
             <a:r>
-              <a:rPr lang="en-GB" kern="1200">
+              <a:rPr lang="en-GB" kern="1200" dirty="0">
                 <a:solidFill>
                   <a:srgbClr val="000000"/>
                 </a:solidFill>
@@ -13889,7 +14068,7 @@
               </a:rPr>
               <a:t>        actions </a:t>
             </a:r>
-            <a:endParaRPr lang="nl-BE">
+            <a:endParaRPr lang="nl-BE" dirty="0">
               <a:effectLst/>
               <a:latin typeface="Consolas" panose="020B0609020204030204" pitchFamily="49" charset="0"/>
               <a:ea typeface="Calibri" panose="020F0502020204030204" pitchFamily="34" charset="0"/>
@@ -13905,7 +14084,7 @@
                 <a:spcPts val="800"/>
               </a:spcAft>
             </a:pPr>
-            <a:endParaRPr lang="en-GB" sz="500" kern="1200">
+            <a:endParaRPr lang="en-GB" sz="500" kern="1200" dirty="0">
               <a:solidFill>
                 <a:srgbClr val="000000"/>
               </a:solidFill>
@@ -13925,7 +14104,7 @@
               </a:spcAft>
             </a:pPr>
             <a:r>
-              <a:rPr lang="en-GB" kern="1200">
+              <a:rPr lang="en-GB" kern="1200" dirty="0">
                 <a:solidFill>
                   <a:srgbClr val="000000"/>
                 </a:solidFill>
@@ -13937,7 +14116,7 @@
               <a:t>    </a:t>
             </a:r>
             <a:r>
-              <a:rPr lang="en-GB" kern="1200">
+              <a:rPr lang="en-GB" kern="1200" dirty="0">
                 <a:solidFill>
                   <a:srgbClr val="4584B6"/>
                 </a:solidFill>
@@ -13949,7 +14128,7 @@
               <a:t>group</a:t>
             </a:r>
             <a:r>
-              <a:rPr lang="en-GB" kern="1200">
+              <a:rPr lang="en-GB" kern="1200" dirty="0">
                 <a:solidFill>
                   <a:srgbClr val="000000"/>
                 </a:solidFill>
@@ -13961,7 +14140,7 @@
               <a:t> </a:t>
             </a:r>
             <a:r>
-              <a:rPr lang="en-GB" kern="1200">
+              <a:rPr lang="en-GB" kern="1200" dirty="0">
                 <a:solidFill>
                   <a:srgbClr val="4584B6"/>
                 </a:solidFill>
@@ -13972,7 +14151,7 @@
               </a:rPr>
               <a:t>final instructions</a:t>
             </a:r>
-            <a:endParaRPr lang="nl-BE">
+            <a:endParaRPr lang="nl-BE" dirty="0">
               <a:effectLst/>
               <a:latin typeface="Consolas" panose="020B0609020204030204" pitchFamily="49" charset="0"/>
               <a:ea typeface="Calibri" panose="020F0502020204030204" pitchFamily="34" charset="0"/>
@@ -13989,7 +14168,7 @@
               </a:spcAft>
             </a:pPr>
             <a:r>
-              <a:rPr lang="en-GB" kern="1200">
+              <a:rPr lang="en-GB" kern="1200" dirty="0">
                 <a:solidFill>
                   <a:srgbClr val="FF0000"/>
                 </a:solidFill>
@@ -14001,7 +14180,7 @@
               <a:t>program</a:t>
             </a:r>
             <a:r>
-              <a:rPr lang="en-GB" kern="1200">
+              <a:rPr lang="en-GB" kern="1200" dirty="0">
                 <a:solidFill>
                   <a:srgbClr val="000000"/>
                 </a:solidFill>
@@ -14013,7 +14192,7 @@
               <a:t> </a:t>
             </a:r>
             <a:r>
-              <a:rPr lang="en-GB" kern="1200">
+              <a:rPr lang="en-GB" kern="1200" dirty="0">
                 <a:solidFill>
                   <a:srgbClr val="FF0000"/>
                 </a:solidFill>
@@ -14024,7 +14203,7 @@
               </a:rPr>
               <a:t>final instructions</a:t>
             </a:r>
-            <a:endParaRPr lang="nl-BE">
+            <a:endParaRPr lang="nl-BE" dirty="0">
               <a:effectLst/>
               <a:latin typeface="Consolas" panose="020B0609020204030204" pitchFamily="49" charset="0"/>
               <a:ea typeface="Calibri" panose="020F0502020204030204" pitchFamily="34" charset="0"/>
@@ -15782,7 +15961,7 @@
                 <a:spcPts val="800"/>
               </a:spcAft>
             </a:pPr>
-            <a:endParaRPr lang="en-GB">
+            <a:endParaRPr lang="en-GB" dirty="0">
               <a:solidFill>
                 <a:srgbClr val="FF0000"/>
               </a:solidFill>
@@ -15801,7 +15980,7 @@
               </a:spcAft>
             </a:pPr>
             <a:r>
-              <a:rPr lang="en-GB" kern="1200">
+              <a:rPr lang="en-GB" kern="1200" dirty="0">
                 <a:solidFill>
                   <a:srgbClr val="FF0000"/>
                 </a:solidFill>
@@ -15813,7 +15992,7 @@
               <a:t>program</a:t>
             </a:r>
             <a:r>
-              <a:rPr lang="en-GB" kern="1200">
+              <a:rPr lang="en-GB" kern="1200" dirty="0">
                 <a:solidFill>
                   <a:srgbClr val="000000"/>
                 </a:solidFill>
@@ -15825,7 +16004,7 @@
               <a:t> </a:t>
             </a:r>
             <a:r>
-              <a:rPr lang="en-GB" kern="1200">
+              <a:rPr lang="en-GB" kern="1200" dirty="0">
                 <a:solidFill>
                   <a:srgbClr val="FF0000"/>
                 </a:solidFill>
@@ -15836,7 +16015,7 @@
               </a:rPr>
               <a:t>start instructions</a:t>
             </a:r>
-            <a:endParaRPr lang="nl-BE">
+            <a:endParaRPr lang="nl-BE" dirty="0">
               <a:effectLst/>
               <a:latin typeface="Consolas" panose="020B0609020204030204" pitchFamily="49" charset="0"/>
               <a:ea typeface="Calibri" panose="020F0502020204030204" pitchFamily="34" charset="0"/>
@@ -15852,7 +16031,7 @@
                 <a:spcPts val="800"/>
               </a:spcAft>
             </a:pPr>
-            <a:endParaRPr lang="en-GB" kern="1200">
+            <a:endParaRPr lang="en-GB" kern="1200" dirty="0">
               <a:solidFill>
                 <a:srgbClr val="000000"/>
               </a:solidFill>
@@ -15871,7 +16050,7 @@
                 <a:spcPts val="800"/>
               </a:spcAft>
             </a:pPr>
-            <a:endParaRPr lang="en-GB">
+            <a:endParaRPr lang="en-GB" dirty="0">
               <a:solidFill>
                 <a:srgbClr val="000000"/>
               </a:solidFill>
@@ -15890,7 +16069,7 @@
               </a:spcAft>
             </a:pPr>
             <a:r>
-              <a:rPr lang="en-GB" kern="1200">
+              <a:rPr lang="en-GB" kern="1200" dirty="0">
                 <a:solidFill>
                   <a:srgbClr val="000000"/>
                 </a:solidFill>
@@ -15902,7 +16081,7 @@
               <a:t>while </a:t>
             </a:r>
             <a:r>
-              <a:rPr lang="en-GB" kern="1200" err="1">
+              <a:rPr lang="en-GB" kern="1200" dirty="0" err="1">
                 <a:solidFill>
                   <a:srgbClr val="000000"/>
                 </a:solidFill>
@@ -15914,7 +16093,7 @@
               <a:t>not_end_data</a:t>
             </a:r>
             <a:r>
-              <a:rPr lang="en-GB" kern="1200">
+              <a:rPr lang="en-GB" kern="1200" dirty="0">
                 <a:solidFill>
                   <a:srgbClr val="000000"/>
                 </a:solidFill>
@@ -15925,7 +16104,7 @@
               </a:rPr>
               <a:t>:</a:t>
             </a:r>
-            <a:endParaRPr lang="nl-BE">
+            <a:endParaRPr lang="nl-BE" dirty="0">
               <a:effectLst/>
               <a:latin typeface="Consolas" panose="020B0609020204030204" pitchFamily="49" charset="0"/>
               <a:ea typeface="Calibri" panose="020F0502020204030204" pitchFamily="34" charset="0"/>
@@ -15942,7 +16121,7 @@
               </a:spcAft>
             </a:pPr>
             <a:r>
-              <a:rPr lang="en-GB" kern="1200">
+              <a:rPr lang="en-GB" kern="1200" dirty="0">
                 <a:solidFill>
                   <a:srgbClr val="000000"/>
                 </a:solidFill>
@@ -15954,7 +16133,7 @@
               <a:t>    </a:t>
             </a:r>
             <a:r>
-              <a:rPr lang="en-GB" kern="1200">
+              <a:rPr lang="en-GB" kern="1200" dirty="0">
                 <a:solidFill>
                   <a:srgbClr val="4584B6"/>
                 </a:solidFill>
@@ -15965,7 +16144,7 @@
               </a:rPr>
               <a:t>group start instructions</a:t>
             </a:r>
-            <a:endParaRPr lang="nl-BE">
+            <a:endParaRPr lang="nl-BE" dirty="0">
               <a:effectLst/>
               <a:latin typeface="Consolas" panose="020B0609020204030204" pitchFamily="49" charset="0"/>
               <a:ea typeface="Calibri" panose="020F0502020204030204" pitchFamily="34" charset="0"/>
@@ -15981,7 +16160,7 @@
                 <a:spcPts val="800"/>
               </a:spcAft>
             </a:pPr>
-            <a:endParaRPr lang="en-GB" sz="700" kern="1200">
+            <a:endParaRPr lang="en-GB" sz="700" kern="1200" dirty="0">
               <a:solidFill>
                 <a:srgbClr val="000000"/>
               </a:solidFill>
@@ -15998,7 +16177,7 @@
               </a:lnSpc>
             </a:pPr>
             <a:r>
-              <a:rPr lang="en-GB" kern="1200">
+              <a:rPr lang="en-GB" kern="1200" dirty="0">
                 <a:solidFill>
                   <a:srgbClr val="000000"/>
                 </a:solidFill>
@@ -16010,7 +16189,7 @@
               <a:t>    while </a:t>
             </a:r>
             <a:r>
-              <a:rPr lang="en-GB" kern="1200" err="1">
+              <a:rPr lang="en-GB" kern="1200" dirty="0" err="1">
                 <a:solidFill>
                   <a:srgbClr val="000000"/>
                 </a:solidFill>
@@ -16022,7 +16201,7 @@
               <a:t>not_end_data</a:t>
             </a:r>
             <a:r>
-              <a:rPr lang="en-GB" kern="1200">
+              <a:rPr lang="en-GB" kern="1200" dirty="0">
                 <a:solidFill>
                   <a:srgbClr val="000000"/>
                 </a:solidFill>
@@ -16033,7 +16212,7 @@
               </a:rPr>
               <a:t> and</a:t>
             </a:r>
-            <a:endParaRPr lang="nl-BE">
+            <a:endParaRPr lang="nl-BE" dirty="0">
               <a:effectLst/>
               <a:latin typeface="Consolas" panose="020B0609020204030204" pitchFamily="49" charset="0"/>
               <a:ea typeface="Calibri" panose="020F0502020204030204" pitchFamily="34" charset="0"/>
@@ -16047,7 +16226,7 @@
               </a:lnSpc>
             </a:pPr>
             <a:r>
-              <a:rPr lang="en-GB" kern="1200" err="1">
+              <a:rPr lang="en-GB" kern="1200" dirty="0" err="1">
                 <a:solidFill>
                   <a:srgbClr val="000000"/>
                 </a:solidFill>
@@ -16059,19 +16238,18 @@
               <a:t>in_the</a:t>
             </a:r>
             <a:r>
-              <a:rPr lang="en-GB" kern="1200">
-                <a:solidFill>
-                  <a:srgbClr val="000000"/>
-                </a:solidFill>
-                <a:effectLst/>
+              <a:rPr lang="en-GB" dirty="0" err="1">
+                <a:solidFill>
+                  <a:srgbClr val="000000"/>
+                </a:solidFill>
                 <a:latin typeface="Consolas" panose="020B0609020204030204" pitchFamily="49" charset="0"/>
                 <a:ea typeface="Calibri" panose="020F0502020204030204" pitchFamily="34" charset="0"/>
                 <a:cs typeface="Courier New" panose="02070309020205020404" pitchFamily="49" charset="0"/>
               </a:rPr>
-              <a:t> </a:t>
-            </a:r>
-            <a:r>
-              <a:rPr lang="en-GB" kern="1200" err="1">
+              <a:t>_</a:t>
+            </a:r>
+            <a:r>
+              <a:rPr lang="en-GB" kern="1200" dirty="0" err="1">
                 <a:solidFill>
                   <a:srgbClr val="000000"/>
                 </a:solidFill>
@@ -16083,7 +16261,7 @@
               <a:t>same_group</a:t>
             </a:r>
             <a:r>
-              <a:rPr lang="en-GB" kern="1200">
+              <a:rPr lang="en-GB" kern="1200" dirty="0">
                 <a:solidFill>
                   <a:srgbClr val="000000"/>
                 </a:solidFill>
@@ -16094,7 +16272,7 @@
               </a:rPr>
               <a:t>:</a:t>
             </a:r>
-            <a:endParaRPr lang="nl-BE">
+            <a:endParaRPr lang="nl-BE" dirty="0">
               <a:effectLst/>
               <a:latin typeface="Consolas" panose="020B0609020204030204" pitchFamily="49" charset="0"/>
               <a:ea typeface="Calibri" panose="020F0502020204030204" pitchFamily="34" charset="0"/>
@@ -16110,7 +16288,7 @@
                 <a:spcPts val="800"/>
               </a:spcAft>
             </a:pPr>
-            <a:endParaRPr lang="en-GB" sz="1000" kern="1200">
+            <a:endParaRPr lang="en-GB" sz="1000" kern="1200" dirty="0">
               <a:solidFill>
                 <a:srgbClr val="000000"/>
               </a:solidFill>
@@ -16130,7 +16308,7 @@
               </a:spcAft>
             </a:pPr>
             <a:r>
-              <a:rPr lang="en-GB" kern="1200">
+              <a:rPr lang="en-GB" kern="1200" dirty="0">
                 <a:solidFill>
                   <a:srgbClr val="000000"/>
                 </a:solidFill>
@@ -16141,7 +16319,7 @@
               </a:rPr>
               <a:t>        actions </a:t>
             </a:r>
-            <a:endParaRPr lang="nl-BE">
+            <a:endParaRPr lang="nl-BE" dirty="0">
               <a:effectLst/>
               <a:latin typeface="Consolas" panose="020B0609020204030204" pitchFamily="49" charset="0"/>
               <a:ea typeface="Calibri" panose="020F0502020204030204" pitchFamily="34" charset="0"/>
@@ -16157,7 +16335,7 @@
                 <a:spcPts val="800"/>
               </a:spcAft>
             </a:pPr>
-            <a:endParaRPr lang="en-GB" sz="500" kern="1200">
+            <a:endParaRPr lang="en-GB" sz="500" kern="1200" dirty="0">
               <a:solidFill>
                 <a:srgbClr val="000000"/>
               </a:solidFill>
@@ -16177,7 +16355,7 @@
               </a:spcAft>
             </a:pPr>
             <a:r>
-              <a:rPr lang="en-GB" kern="1200">
+              <a:rPr lang="en-GB" kern="1200" dirty="0">
                 <a:solidFill>
                   <a:srgbClr val="000000"/>
                 </a:solidFill>
@@ -16189,7 +16367,7 @@
               <a:t>    </a:t>
             </a:r>
             <a:r>
-              <a:rPr lang="en-GB" kern="1200">
+              <a:rPr lang="en-GB" kern="1200" dirty="0">
                 <a:solidFill>
                   <a:srgbClr val="4584B6"/>
                 </a:solidFill>
@@ -16201,7 +16379,7 @@
               <a:t>group</a:t>
             </a:r>
             <a:r>
-              <a:rPr lang="en-GB" kern="1200">
+              <a:rPr lang="en-GB" kern="1200" dirty="0">
                 <a:solidFill>
                   <a:srgbClr val="000000"/>
                 </a:solidFill>
@@ -16213,7 +16391,7 @@
               <a:t> </a:t>
             </a:r>
             <a:r>
-              <a:rPr lang="en-GB" kern="1200">
+              <a:rPr lang="en-GB" kern="1200" dirty="0">
                 <a:solidFill>
                   <a:srgbClr val="4584B6"/>
                 </a:solidFill>
@@ -16224,7 +16402,7 @@
               </a:rPr>
               <a:t>final instructions</a:t>
             </a:r>
-            <a:endParaRPr lang="nl-BE">
+            <a:endParaRPr lang="nl-BE" dirty="0">
               <a:effectLst/>
               <a:latin typeface="Consolas" panose="020B0609020204030204" pitchFamily="49" charset="0"/>
               <a:ea typeface="Calibri" panose="020F0502020204030204" pitchFamily="34" charset="0"/>
@@ -16240,7 +16418,7 @@
                 <a:spcPts val="800"/>
               </a:spcAft>
             </a:pPr>
-            <a:endParaRPr lang="en-GB" kern="1200">
+            <a:endParaRPr lang="en-GB" kern="1200" dirty="0">
               <a:solidFill>
                 <a:srgbClr val="FF0000"/>
               </a:solidFill>
@@ -16260,7 +16438,7 @@
               </a:spcAft>
             </a:pPr>
             <a:r>
-              <a:rPr lang="en-GB" kern="1200">
+              <a:rPr lang="en-GB" kern="1200" dirty="0">
                 <a:solidFill>
                   <a:srgbClr val="FF0000"/>
                 </a:solidFill>
@@ -16272,7 +16450,7 @@
               <a:t>program</a:t>
             </a:r>
             <a:r>
-              <a:rPr lang="en-GB" kern="1200">
+              <a:rPr lang="en-GB" kern="1200" dirty="0">
                 <a:solidFill>
                   <a:srgbClr val="000000"/>
                 </a:solidFill>
@@ -16284,7 +16462,7 @@
               <a:t> </a:t>
             </a:r>
             <a:r>
-              <a:rPr lang="en-GB" kern="1200">
+              <a:rPr lang="en-GB" kern="1200" dirty="0">
                 <a:solidFill>
                   <a:srgbClr val="FF0000"/>
                 </a:solidFill>
@@ -16295,7 +16473,7 @@
               </a:rPr>
               <a:t>final instructions</a:t>
             </a:r>
-            <a:endParaRPr lang="nl-BE">
+            <a:endParaRPr lang="nl-BE" dirty="0">
               <a:effectLst/>
               <a:latin typeface="Consolas" panose="020B0609020204030204" pitchFamily="49" charset="0"/>
               <a:ea typeface="Calibri" panose="020F0502020204030204" pitchFamily="34" charset="0"/>
@@ -17564,7 +17742,7 @@
           <a:lstStyle/>
           <a:p>
             <a:r>
-              <a:rPr lang="nl-BE" sz="1400">
+              <a:rPr lang="nl-BE" sz="1400" dirty="0">
                 <a:solidFill>
                   <a:schemeClr val="accent1">
                     <a:lumMod val="75000"/>

</xml_diff>